<commit_message>
add presentation images fixed a few typos
</commit_message>
<xml_diff>
--- a/ppt/presentation.pptx
+++ b/ppt/presentation.pptx
@@ -8,6 +8,16 @@
     <p:sldId id="256" r:id="rId2"/>
     <p:sldId id="257" r:id="rId3"/>
     <p:sldId id="258" r:id="rId4"/>
+    <p:sldId id="259" r:id="rId5"/>
+    <p:sldId id="260" r:id="rId6"/>
+    <p:sldId id="261" r:id="rId7"/>
+    <p:sldId id="262" r:id="rId8"/>
+    <p:sldId id="263" r:id="rId9"/>
+    <p:sldId id="264" r:id="rId10"/>
+    <p:sldId id="265" r:id="rId11"/>
+    <p:sldId id="266" r:id="rId12"/>
+    <p:sldId id="267" r:id="rId13"/>
+    <p:sldId id="268" r:id="rId14"/>
   </p:sldIdLst>
   <p:sldSz cx="12192000" cy="6858000"/>
   <p:notesSz cx="6858000" cy="9144000"/>
@@ -3864,6 +3874,473 @@
 </p:sld>
 </file>
 
+<file path=ppt/slides/slide10.xml><?xml version="1.0" encoding="utf-8"?>
+<p:sld xmlns:a="http://schemas.openxmlformats.org/drawingml/2006/main" xmlns:r="http://schemas.openxmlformats.org/officeDocument/2006/relationships" xmlns:p="http://schemas.openxmlformats.org/presentationml/2006/main">
+  <p:cSld>
+    <p:spTree>
+      <p:nvGrpSpPr>
+        <p:cNvPr id="1" name=""/>
+        <p:cNvGrpSpPr/>
+        <p:nvPr/>
+      </p:nvGrpSpPr>
+      <p:grpSpPr>
+        <a:xfrm>
+          <a:off x="0" y="0"/>
+          <a:ext cx="0" cy="0"/>
+          <a:chOff x="0" y="0"/>
+          <a:chExt cx="0" cy="0"/>
+        </a:xfrm>
+      </p:grpSpPr>
+      <p:sp>
+        <p:nvSpPr>
+          <p:cNvPr id="2" name="Title 1">
+            <a:extLst>
+              <a:ext uri="{FF2B5EF4-FFF2-40B4-BE49-F238E27FC236}">
+                <a16:creationId xmlns:a16="http://schemas.microsoft.com/office/drawing/2014/main" id="{C77BC870-AA74-47F1-85B3-0341A6F3F8C9}"/>
+              </a:ext>
+            </a:extLst>
+          </p:cNvPr>
+          <p:cNvSpPr>
+            <a:spLocks noGrp="1"/>
+          </p:cNvSpPr>
+          <p:nvPr>
+            <p:ph type="title"/>
+          </p:nvPr>
+        </p:nvSpPr>
+        <p:spPr/>
+        <p:txBody>
+          <a:bodyPr/>
+          <a:lstStyle/>
+          <a:p>
+            <a:r>
+              <a:rPr lang="en-MY" b="1" dirty="0"/>
+              <a:t>Tech and languages</a:t>
+            </a:r>
+            <a:br>
+              <a:rPr lang="en-MY" dirty="0"/>
+            </a:br>
+            <a:endParaRPr lang="en-MY" dirty="0"/>
+          </a:p>
+        </p:txBody>
+      </p:sp>
+      <p:sp>
+        <p:nvSpPr>
+          <p:cNvPr id="3" name="Content Placeholder 2">
+            <a:extLst>
+              <a:ext uri="{FF2B5EF4-FFF2-40B4-BE49-F238E27FC236}">
+                <a16:creationId xmlns:a16="http://schemas.microsoft.com/office/drawing/2014/main" id="{75617E40-6099-4C67-A4BD-A3D85C04741A}"/>
+              </a:ext>
+            </a:extLst>
+          </p:cNvPr>
+          <p:cNvSpPr>
+            <a:spLocks noGrp="1"/>
+          </p:cNvSpPr>
+          <p:nvPr>
+            <p:ph sz="half" idx="1"/>
+          </p:nvPr>
+        </p:nvSpPr>
+        <p:spPr>
+          <a:xfrm>
+            <a:off x="1371600" y="2285999"/>
+            <a:ext cx="3783496" cy="3581401"/>
+          </a:xfrm>
+        </p:spPr>
+        <p:txBody>
+          <a:bodyPr>
+            <a:normAutofit/>
+          </a:bodyPr>
+          <a:lstStyle/>
+          <a:p>
+            <a:r>
+              <a:rPr lang="en-MY" dirty="0"/>
+              <a:t>Html</a:t>
+            </a:r>
+          </a:p>
+          <a:p>
+            <a:r>
+              <a:rPr lang="en-MY" dirty="0" err="1"/>
+              <a:t>Css</a:t>
+            </a:r>
+            <a:endParaRPr lang="en-MY" dirty="0"/>
+          </a:p>
+          <a:p>
+            <a:r>
+              <a:rPr lang="en-MY" dirty="0"/>
+              <a:t>JavaScript</a:t>
+            </a:r>
+          </a:p>
+          <a:p>
+            <a:r>
+              <a:rPr lang="en-MY" dirty="0"/>
+              <a:t>Fireworks</a:t>
+            </a:r>
+          </a:p>
+          <a:p>
+            <a:r>
+              <a:rPr lang="en-MY" dirty="0"/>
+              <a:t>Photoshop</a:t>
+            </a:r>
+          </a:p>
+          <a:p>
+            <a:r>
+              <a:rPr lang="en-MY" dirty="0"/>
+              <a:t>GitHub</a:t>
+            </a:r>
+          </a:p>
+          <a:p>
+            <a:endParaRPr lang="en-MY" dirty="0"/>
+          </a:p>
+        </p:txBody>
+      </p:sp>
+      <p:sp>
+        <p:nvSpPr>
+          <p:cNvPr id="4" name="Content Placeholder 3">
+            <a:extLst>
+              <a:ext uri="{FF2B5EF4-FFF2-40B4-BE49-F238E27FC236}">
+                <a16:creationId xmlns:a16="http://schemas.microsoft.com/office/drawing/2014/main" id="{B9D19A2A-F471-4055-9690-CEB86A5EE657}"/>
+              </a:ext>
+            </a:extLst>
+          </p:cNvPr>
+          <p:cNvSpPr>
+            <a:spLocks noGrp="1"/>
+          </p:cNvSpPr>
+          <p:nvPr>
+            <p:ph sz="half" idx="2"/>
+          </p:nvPr>
+        </p:nvSpPr>
+        <p:spPr>
+          <a:xfrm>
+            <a:off x="4458063" y="2285998"/>
+            <a:ext cx="4049833" cy="2961863"/>
+          </a:xfrm>
+        </p:spPr>
+        <p:txBody>
+          <a:bodyPr/>
+          <a:lstStyle/>
+          <a:p>
+            <a:r>
+              <a:rPr lang="en-MY" dirty="0"/>
+              <a:t>Balsamic</a:t>
+            </a:r>
+          </a:p>
+          <a:p>
+            <a:r>
+              <a:rPr lang="en-MY" dirty="0"/>
+              <a:t>Visual Studios</a:t>
+            </a:r>
+          </a:p>
+          <a:p>
+            <a:r>
+              <a:rPr lang="en-MY" dirty="0"/>
+              <a:t>terminal</a:t>
+            </a:r>
+          </a:p>
+          <a:p>
+            <a:r>
+              <a:rPr lang="en-MY" dirty="0"/>
+              <a:t>Cloud Flare – (CDN)</a:t>
+            </a:r>
+          </a:p>
+          <a:p>
+            <a:endParaRPr lang="en-MY" dirty="0"/>
+          </a:p>
+          <a:p>
+            <a:endParaRPr lang="en-MY" dirty="0"/>
+          </a:p>
+        </p:txBody>
+      </p:sp>
+    </p:spTree>
+    <p:extLst>
+      <p:ext uri="{BB962C8B-B14F-4D97-AF65-F5344CB8AC3E}">
+        <p14:creationId xmlns:p14="http://schemas.microsoft.com/office/powerpoint/2010/main" val="1380893701"/>
+      </p:ext>
+    </p:extLst>
+  </p:cSld>
+  <p:clrMapOvr>
+    <a:masterClrMapping/>
+  </p:clrMapOvr>
+</p:sld>
+</file>
+
+<file path=ppt/slides/slide11.xml><?xml version="1.0" encoding="utf-8"?>
+<p:sld xmlns:a="http://schemas.openxmlformats.org/drawingml/2006/main" xmlns:r="http://schemas.openxmlformats.org/officeDocument/2006/relationships" xmlns:p="http://schemas.openxmlformats.org/presentationml/2006/main">
+  <p:cSld>
+    <p:spTree>
+      <p:nvGrpSpPr>
+        <p:cNvPr id="1" name=""/>
+        <p:cNvGrpSpPr/>
+        <p:nvPr/>
+      </p:nvGrpSpPr>
+      <p:grpSpPr>
+        <a:xfrm>
+          <a:off x="0" y="0"/>
+          <a:ext cx="0" cy="0"/>
+          <a:chOff x="0" y="0"/>
+          <a:chExt cx="0" cy="0"/>
+        </a:xfrm>
+      </p:grpSpPr>
+      <p:sp>
+        <p:nvSpPr>
+          <p:cNvPr id="2" name="Title 1">
+            <a:extLst>
+              <a:ext uri="{FF2B5EF4-FFF2-40B4-BE49-F238E27FC236}">
+                <a16:creationId xmlns:a16="http://schemas.microsoft.com/office/drawing/2014/main" id="{BD593863-3CAE-4D32-BF00-60BE6E07AC13}"/>
+              </a:ext>
+            </a:extLst>
+          </p:cNvPr>
+          <p:cNvSpPr>
+            <a:spLocks noGrp="1"/>
+          </p:cNvSpPr>
+          <p:nvPr>
+            <p:ph type="title"/>
+          </p:nvPr>
+        </p:nvSpPr>
+        <p:spPr/>
+        <p:txBody>
+          <a:bodyPr/>
+          <a:lstStyle/>
+          <a:p>
+            <a:r>
+              <a:rPr lang="en-US" dirty="0"/>
+              <a:t>Trello</a:t>
+            </a:r>
+            <a:endParaRPr lang="en-MY" dirty="0"/>
+          </a:p>
+        </p:txBody>
+      </p:sp>
+      <p:pic>
+        <p:nvPicPr>
+          <p:cNvPr id="7" name="Content Placeholder 6">
+            <a:extLst>
+              <a:ext uri="{FF2B5EF4-FFF2-40B4-BE49-F238E27FC236}">
+                <a16:creationId xmlns:a16="http://schemas.microsoft.com/office/drawing/2014/main" id="{BE5C2AD5-2F14-48B5-B90E-5EEE5E613F24}"/>
+              </a:ext>
+            </a:extLst>
+          </p:cNvPr>
+          <p:cNvPicPr>
+            <a:picLocks noGrp="1" noChangeAspect="1"/>
+          </p:cNvPicPr>
+          <p:nvPr>
+            <p:ph idx="1"/>
+          </p:nvPr>
+        </p:nvPicPr>
+        <p:blipFill>
+          <a:blip r:embed="rId2"/>
+          <a:stretch>
+            <a:fillRect/>
+          </a:stretch>
+        </p:blipFill>
+        <p:spPr>
+          <a:xfrm>
+            <a:off x="1749288" y="1528938"/>
+            <a:ext cx="9378494" cy="4510740"/>
+          </a:xfrm>
+        </p:spPr>
+      </p:pic>
+    </p:spTree>
+    <p:extLst>
+      <p:ext uri="{BB962C8B-B14F-4D97-AF65-F5344CB8AC3E}">
+        <p14:creationId xmlns:p14="http://schemas.microsoft.com/office/powerpoint/2010/main" val="2325242116"/>
+      </p:ext>
+    </p:extLst>
+  </p:cSld>
+  <p:clrMapOvr>
+    <a:masterClrMapping/>
+  </p:clrMapOvr>
+</p:sld>
+</file>
+
+<file path=ppt/slides/slide12.xml><?xml version="1.0" encoding="utf-8"?>
+<p:sld xmlns:a="http://schemas.openxmlformats.org/drawingml/2006/main" xmlns:r="http://schemas.openxmlformats.org/officeDocument/2006/relationships" xmlns:p="http://schemas.openxmlformats.org/presentationml/2006/main">
+  <p:cSld>
+    <p:spTree>
+      <p:nvGrpSpPr>
+        <p:cNvPr id="1" name=""/>
+        <p:cNvGrpSpPr/>
+        <p:nvPr/>
+      </p:nvGrpSpPr>
+      <p:grpSpPr>
+        <a:xfrm>
+          <a:off x="0" y="0"/>
+          <a:ext cx="0" cy="0"/>
+          <a:chOff x="0" y="0"/>
+          <a:chExt cx="0" cy="0"/>
+        </a:xfrm>
+      </p:grpSpPr>
+      <p:sp>
+        <p:nvSpPr>
+          <p:cNvPr id="2" name="Title 1">
+            <a:extLst>
+              <a:ext uri="{FF2B5EF4-FFF2-40B4-BE49-F238E27FC236}">
+                <a16:creationId xmlns:a16="http://schemas.microsoft.com/office/drawing/2014/main" id="{1987A56B-6D89-4FEE-A160-92A9613DE616}"/>
+              </a:ext>
+            </a:extLst>
+          </p:cNvPr>
+          <p:cNvSpPr>
+            <a:spLocks noGrp="1"/>
+          </p:cNvSpPr>
+          <p:nvPr>
+            <p:ph type="title"/>
+          </p:nvPr>
+        </p:nvSpPr>
+        <p:spPr/>
+        <p:txBody>
+          <a:bodyPr/>
+          <a:lstStyle/>
+          <a:p>
+            <a:r>
+              <a:rPr lang="en-US" dirty="0"/>
+              <a:t>Trello</a:t>
+            </a:r>
+            <a:endParaRPr lang="en-MY" dirty="0"/>
+          </a:p>
+        </p:txBody>
+      </p:sp>
+      <p:pic>
+        <p:nvPicPr>
+          <p:cNvPr id="5" name="Content Placeholder 4">
+            <a:extLst>
+              <a:ext uri="{FF2B5EF4-FFF2-40B4-BE49-F238E27FC236}">
+                <a16:creationId xmlns:a16="http://schemas.microsoft.com/office/drawing/2014/main" id="{C7879762-FC31-41EB-923F-A153C8891682}"/>
+              </a:ext>
+            </a:extLst>
+          </p:cNvPr>
+          <p:cNvPicPr>
+            <a:picLocks noGrp="1" noChangeAspect="1"/>
+          </p:cNvPicPr>
+          <p:nvPr>
+            <p:ph idx="1"/>
+          </p:nvPr>
+        </p:nvPicPr>
+        <p:blipFill>
+          <a:blip r:embed="rId2"/>
+          <a:stretch>
+            <a:fillRect/>
+          </a:stretch>
+        </p:blipFill>
+        <p:spPr>
+          <a:xfrm>
+            <a:off x="1595096" y="1601857"/>
+            <a:ext cx="9819437" cy="4581939"/>
+          </a:xfrm>
+        </p:spPr>
+      </p:pic>
+    </p:spTree>
+    <p:extLst>
+      <p:ext uri="{BB962C8B-B14F-4D97-AF65-F5344CB8AC3E}">
+        <p14:creationId xmlns:p14="http://schemas.microsoft.com/office/powerpoint/2010/main" val="580348007"/>
+      </p:ext>
+    </p:extLst>
+  </p:cSld>
+  <p:clrMapOvr>
+    <a:masterClrMapping/>
+  </p:clrMapOvr>
+</p:sld>
+</file>
+
+<file path=ppt/slides/slide13.xml><?xml version="1.0" encoding="utf-8"?>
+<p:sld xmlns:a="http://schemas.openxmlformats.org/drawingml/2006/main" xmlns:r="http://schemas.openxmlformats.org/officeDocument/2006/relationships" xmlns:p="http://schemas.openxmlformats.org/presentationml/2006/main">
+  <p:cSld>
+    <p:spTree>
+      <p:nvGrpSpPr>
+        <p:cNvPr id="1" name=""/>
+        <p:cNvGrpSpPr/>
+        <p:nvPr/>
+      </p:nvGrpSpPr>
+      <p:grpSpPr>
+        <a:xfrm>
+          <a:off x="0" y="0"/>
+          <a:ext cx="0" cy="0"/>
+          <a:chOff x="0" y="0"/>
+          <a:chExt cx="0" cy="0"/>
+        </a:xfrm>
+      </p:grpSpPr>
+      <p:sp>
+        <p:nvSpPr>
+          <p:cNvPr id="2" name="Title 1">
+            <a:extLst>
+              <a:ext uri="{FF2B5EF4-FFF2-40B4-BE49-F238E27FC236}">
+                <a16:creationId xmlns:a16="http://schemas.microsoft.com/office/drawing/2014/main" id="{F0E215DE-22A5-48BA-81F2-46CCAFBB7613}"/>
+              </a:ext>
+            </a:extLst>
+          </p:cNvPr>
+          <p:cNvSpPr>
+            <a:spLocks noGrp="1"/>
+          </p:cNvSpPr>
+          <p:nvPr>
+            <p:ph type="title"/>
+          </p:nvPr>
+        </p:nvSpPr>
+        <p:spPr/>
+        <p:txBody>
+          <a:bodyPr/>
+          <a:lstStyle/>
+          <a:p>
+            <a:r>
+              <a:rPr lang="en-US" dirty="0"/>
+              <a:t>Show website</a:t>
+            </a:r>
+            <a:endParaRPr lang="en-MY" dirty="0"/>
+          </a:p>
+        </p:txBody>
+      </p:sp>
+      <p:sp>
+        <p:nvSpPr>
+          <p:cNvPr id="3" name="Content Placeholder 2">
+            <a:extLst>
+              <a:ext uri="{FF2B5EF4-FFF2-40B4-BE49-F238E27FC236}">
+                <a16:creationId xmlns:a16="http://schemas.microsoft.com/office/drawing/2014/main" id="{88546A86-3BA1-470F-897B-A90DB4CDB34A}"/>
+              </a:ext>
+            </a:extLst>
+          </p:cNvPr>
+          <p:cNvSpPr>
+            <a:spLocks noGrp="1"/>
+          </p:cNvSpPr>
+          <p:nvPr>
+            <p:ph idx="1"/>
+          </p:nvPr>
+        </p:nvSpPr>
+        <p:spPr/>
+        <p:txBody>
+          <a:bodyPr/>
+          <a:lstStyle/>
+          <a:p>
+            <a:r>
+              <a:rPr lang="en-MY" dirty="0">
+                <a:solidFill>
+                  <a:srgbClr val="0070C0"/>
+                </a:solidFill>
+                <a:hlinkClick r:id="rId2">
+                  <a:extLst>
+                    <a:ext uri="{A12FA001-AC4F-418D-AE19-62706E023703}">
+                      <ahyp:hlinkClr xmlns:ahyp="http://schemas.microsoft.com/office/drawing/2018/hyperlinkcolor" val="tx"/>
+                    </a:ext>
+                  </a:extLst>
+                </a:hlinkClick>
+              </a:rPr>
+              <a:t>Click Me https://adam22gary.github.io/</a:t>
+            </a:r>
+            <a:endParaRPr lang="en-MY" dirty="0">
+              <a:solidFill>
+                <a:srgbClr val="0070C0"/>
+              </a:solidFill>
+            </a:endParaRPr>
+          </a:p>
+        </p:txBody>
+      </p:sp>
+    </p:spTree>
+    <p:extLst>
+      <p:ext uri="{BB962C8B-B14F-4D97-AF65-F5344CB8AC3E}">
+        <p14:creationId xmlns:p14="http://schemas.microsoft.com/office/powerpoint/2010/main" val="2793985536"/>
+      </p:ext>
+    </p:extLst>
+  </p:cSld>
+  <p:clrMapOvr>
+    <a:masterClrMapping/>
+  </p:clrMapOvr>
+</p:sld>
+</file>
+
 <file path=ppt/slides/slide2.xml><?xml version="1.0" encoding="utf-8"?>
 <p:sld xmlns:a="http://schemas.openxmlformats.org/drawingml/2006/main" xmlns:r="http://schemas.openxmlformats.org/officeDocument/2006/relationships" xmlns:p="http://schemas.openxmlformats.org/presentationml/2006/main">
   <p:cSld>
@@ -3931,7 +4408,9 @@
         </p:nvSpPr>
         <p:spPr/>
         <p:txBody>
-          <a:bodyPr/>
+          <a:bodyPr>
+            <a:normAutofit/>
+          </a:bodyPr>
           <a:lstStyle/>
           <a:p>
             <a:r>
@@ -4002,22 +4481,24 @@
         <p:spPr>
           <a:xfrm>
             <a:off x="6096000" y="2285999"/>
-            <a:ext cx="5102087" cy="1848679"/>
-          </a:xfrm>
-        </p:spPr>
-        <p:txBody>
-          <a:bodyPr/>
+            <a:ext cx="5486400" cy="2140227"/>
+          </a:xfrm>
+        </p:spPr>
+        <p:txBody>
+          <a:bodyPr>
+            <a:normAutofit/>
+          </a:bodyPr>
           <a:lstStyle/>
           <a:p>
             <a:r>
-              <a:rPr lang="en-US" dirty="0"/>
-              <a:t>Responsive website on all devices</a:t>
-            </a:r>
-          </a:p>
-          <a:p>
-            <a:r>
-              <a:rPr lang="en-US" dirty="0"/>
-              <a:t>On click JavaScript</a:t>
+              <a:rPr lang="en-MY" dirty="0"/>
+              <a:t>Responsive on all devices</a:t>
+            </a:r>
+          </a:p>
+          <a:p>
+            <a:r>
+              <a:rPr lang="en-MY" dirty="0"/>
+              <a:t>JavaScript - on click functions</a:t>
             </a:r>
           </a:p>
           <a:p>
@@ -4129,34 +4610,39 @@
           <a:lstStyle/>
           <a:p>
             <a:r>
-              <a:rPr lang="en-US" dirty="0"/>
-              <a:t>The use of white space and padding to unclutter the website</a:t>
-            </a:r>
-          </a:p>
-          <a:p>
-            <a:r>
-              <a:rPr lang="en-US" dirty="0"/>
-              <a:t>The use of the </a:t>
-            </a:r>
+              <a:rPr lang="en-MY" dirty="0"/>
+              <a:t>alt attribute on image tag for accessibility</a:t>
+            </a:r>
+          </a:p>
+          <a:p>
             <a:r>
               <a:rPr lang="en-MY" dirty="0"/>
               <a:t>title attribute on anchor tag, button, images and links</a:t>
             </a:r>
-            <a:endParaRPr lang="en-US" dirty="0"/>
           </a:p>
           <a:p>
             <a:r>
               <a:rPr lang="en-MY" dirty="0"/>
-              <a:t>Content </a:t>
-            </a:r>
-            <a:r>
-              <a:rPr lang="en-MY" dirty="0" err="1"/>
-              <a:t>centered</a:t>
-            </a:r>
+              <a:t>The use of white space and padding to unclutter the website</a:t>
+            </a:r>
+          </a:p>
+          <a:p>
             <a:r>
               <a:rPr lang="en-MY" dirty="0"/>
-              <a:t> for desktop and mobile</a:t>
-            </a:r>
+              <a:t>A responsive website on all devices</a:t>
+            </a:r>
+          </a:p>
+          <a:p>
+            <a:r>
+              <a:rPr lang="en-MY" dirty="0"/>
+              <a:t>The use of correct and relevant content - focus more on content and layout functions</a:t>
+            </a:r>
+          </a:p>
+          <a:p>
+            <a:endParaRPr lang="en-MY" dirty="0"/>
+          </a:p>
+          <a:p>
+            <a:endParaRPr lang="en-MY" dirty="0"/>
           </a:p>
           <a:p>
             <a:endParaRPr lang="en-MY" dirty="0"/>
@@ -4167,6 +4653,599 @@
     <p:extLst>
       <p:ext uri="{BB962C8B-B14F-4D97-AF65-F5344CB8AC3E}">
         <p14:creationId xmlns:p14="http://schemas.microsoft.com/office/powerpoint/2010/main" val="3125026910"/>
+      </p:ext>
+    </p:extLst>
+  </p:cSld>
+  <p:clrMapOvr>
+    <a:masterClrMapping/>
+  </p:clrMapOvr>
+</p:sld>
+</file>
+
+<file path=ppt/slides/slide4.xml><?xml version="1.0" encoding="utf-8"?>
+<p:sld xmlns:a="http://schemas.openxmlformats.org/drawingml/2006/main" xmlns:r="http://schemas.openxmlformats.org/officeDocument/2006/relationships" xmlns:p="http://schemas.openxmlformats.org/presentationml/2006/main">
+  <p:cSld>
+    <p:spTree>
+      <p:nvGrpSpPr>
+        <p:cNvPr id="1" name=""/>
+        <p:cNvGrpSpPr/>
+        <p:nvPr/>
+      </p:nvGrpSpPr>
+      <p:grpSpPr>
+        <a:xfrm>
+          <a:off x="0" y="0"/>
+          <a:ext cx="0" cy="0"/>
+          <a:chOff x="0" y="0"/>
+          <a:chExt cx="0" cy="0"/>
+        </a:xfrm>
+      </p:grpSpPr>
+      <p:sp>
+        <p:nvSpPr>
+          <p:cNvPr id="2" name="Title 1">
+            <a:extLst>
+              <a:ext uri="{FF2B5EF4-FFF2-40B4-BE49-F238E27FC236}">
+                <a16:creationId xmlns:a16="http://schemas.microsoft.com/office/drawing/2014/main" id="{B79D0BEF-29AA-48B3-9904-765EE65E7992}"/>
+              </a:ext>
+            </a:extLst>
+          </p:cNvPr>
+          <p:cNvSpPr>
+            <a:spLocks noGrp="1"/>
+          </p:cNvSpPr>
+          <p:nvPr>
+            <p:ph type="title"/>
+          </p:nvPr>
+        </p:nvSpPr>
+        <p:spPr/>
+        <p:txBody>
+          <a:bodyPr/>
+          <a:lstStyle/>
+          <a:p>
+            <a:r>
+              <a:rPr lang="en-US" dirty="0"/>
+              <a:t>Wireframes – Welcome Message</a:t>
+            </a:r>
+            <a:endParaRPr lang="en-MY" dirty="0"/>
+          </a:p>
+        </p:txBody>
+      </p:sp>
+      <p:pic>
+        <p:nvPicPr>
+          <p:cNvPr id="5" name="Content Placeholder 4">
+            <a:extLst>
+              <a:ext uri="{FF2B5EF4-FFF2-40B4-BE49-F238E27FC236}">
+                <a16:creationId xmlns:a16="http://schemas.microsoft.com/office/drawing/2014/main" id="{12A848C7-C326-4331-91C6-C9470845999D}"/>
+              </a:ext>
+            </a:extLst>
+          </p:cNvPr>
+          <p:cNvPicPr>
+            <a:picLocks noGrp="1" noChangeAspect="1"/>
+          </p:cNvPicPr>
+          <p:nvPr>
+            <p:ph idx="1"/>
+          </p:nvPr>
+        </p:nvPicPr>
+        <p:blipFill>
+          <a:blip r:embed="rId2"/>
+          <a:stretch>
+            <a:fillRect/>
+          </a:stretch>
+        </p:blipFill>
+        <p:spPr>
+          <a:xfrm>
+            <a:off x="3049886" y="1364973"/>
+            <a:ext cx="6920564" cy="5239567"/>
+          </a:xfrm>
+        </p:spPr>
+      </p:pic>
+    </p:spTree>
+    <p:extLst>
+      <p:ext uri="{BB962C8B-B14F-4D97-AF65-F5344CB8AC3E}">
+        <p14:creationId xmlns:p14="http://schemas.microsoft.com/office/powerpoint/2010/main" val="2006028680"/>
+      </p:ext>
+    </p:extLst>
+  </p:cSld>
+  <p:clrMapOvr>
+    <a:masterClrMapping/>
+  </p:clrMapOvr>
+</p:sld>
+</file>
+
+<file path=ppt/slides/slide5.xml><?xml version="1.0" encoding="utf-8"?>
+<p:sld xmlns:a="http://schemas.openxmlformats.org/drawingml/2006/main" xmlns:r="http://schemas.openxmlformats.org/officeDocument/2006/relationships" xmlns:p="http://schemas.openxmlformats.org/presentationml/2006/main">
+  <p:cSld>
+    <p:spTree>
+      <p:nvGrpSpPr>
+        <p:cNvPr id="1" name=""/>
+        <p:cNvGrpSpPr/>
+        <p:nvPr/>
+      </p:nvGrpSpPr>
+      <p:grpSpPr>
+        <a:xfrm>
+          <a:off x="0" y="0"/>
+          <a:ext cx="0" cy="0"/>
+          <a:chOff x="0" y="0"/>
+          <a:chExt cx="0" cy="0"/>
+        </a:xfrm>
+      </p:grpSpPr>
+      <p:sp>
+        <p:nvSpPr>
+          <p:cNvPr id="2" name="Title 1">
+            <a:extLst>
+              <a:ext uri="{FF2B5EF4-FFF2-40B4-BE49-F238E27FC236}">
+                <a16:creationId xmlns:a16="http://schemas.microsoft.com/office/drawing/2014/main" id="{A47D828D-2086-46E3-B849-F3FB656CA14D}"/>
+              </a:ext>
+            </a:extLst>
+          </p:cNvPr>
+          <p:cNvSpPr>
+            <a:spLocks noGrp="1"/>
+          </p:cNvSpPr>
+          <p:nvPr>
+            <p:ph type="title"/>
+          </p:nvPr>
+        </p:nvSpPr>
+        <p:spPr/>
+        <p:txBody>
+          <a:bodyPr/>
+          <a:lstStyle/>
+          <a:p>
+            <a:r>
+              <a:rPr lang="en-US" dirty="0"/>
+              <a:t>Wireframes – Gallery – Flex Box</a:t>
+            </a:r>
+            <a:endParaRPr lang="en-MY" dirty="0"/>
+          </a:p>
+        </p:txBody>
+      </p:sp>
+      <p:pic>
+        <p:nvPicPr>
+          <p:cNvPr id="5" name="Content Placeholder 4">
+            <a:extLst>
+              <a:ext uri="{FF2B5EF4-FFF2-40B4-BE49-F238E27FC236}">
+                <a16:creationId xmlns:a16="http://schemas.microsoft.com/office/drawing/2014/main" id="{04DC6EC7-BEBD-4D93-A696-D70A9E1F3759}"/>
+              </a:ext>
+            </a:extLst>
+          </p:cNvPr>
+          <p:cNvPicPr>
+            <a:picLocks noGrp="1" noChangeAspect="1"/>
+          </p:cNvPicPr>
+          <p:nvPr>
+            <p:ph idx="1"/>
+          </p:nvPr>
+        </p:nvPicPr>
+        <p:blipFill>
+          <a:blip r:embed="rId2"/>
+          <a:stretch>
+            <a:fillRect/>
+          </a:stretch>
+        </p:blipFill>
+        <p:spPr>
+          <a:xfrm>
+            <a:off x="2664018" y="1381875"/>
+            <a:ext cx="6863964" cy="5293908"/>
+          </a:xfrm>
+        </p:spPr>
+      </p:pic>
+    </p:spTree>
+    <p:extLst>
+      <p:ext uri="{BB962C8B-B14F-4D97-AF65-F5344CB8AC3E}">
+        <p14:creationId xmlns:p14="http://schemas.microsoft.com/office/powerpoint/2010/main" val="2681596174"/>
+      </p:ext>
+    </p:extLst>
+  </p:cSld>
+  <p:clrMapOvr>
+    <a:masterClrMapping/>
+  </p:clrMapOvr>
+</p:sld>
+</file>
+
+<file path=ppt/slides/slide6.xml><?xml version="1.0" encoding="utf-8"?>
+<p:sld xmlns:a="http://schemas.openxmlformats.org/drawingml/2006/main" xmlns:r="http://schemas.openxmlformats.org/officeDocument/2006/relationships" xmlns:p="http://schemas.openxmlformats.org/presentationml/2006/main">
+  <p:cSld>
+    <p:spTree>
+      <p:nvGrpSpPr>
+        <p:cNvPr id="1" name=""/>
+        <p:cNvGrpSpPr/>
+        <p:nvPr/>
+      </p:nvGrpSpPr>
+      <p:grpSpPr>
+        <a:xfrm>
+          <a:off x="0" y="0"/>
+          <a:ext cx="0" cy="0"/>
+          <a:chOff x="0" y="0"/>
+          <a:chExt cx="0" cy="0"/>
+        </a:xfrm>
+      </p:grpSpPr>
+      <p:sp>
+        <p:nvSpPr>
+          <p:cNvPr id="2" name="Title 1">
+            <a:extLst>
+              <a:ext uri="{FF2B5EF4-FFF2-40B4-BE49-F238E27FC236}">
+                <a16:creationId xmlns:a16="http://schemas.microsoft.com/office/drawing/2014/main" id="{A87B7A01-5533-4EE0-AC45-C32010706C34}"/>
+              </a:ext>
+            </a:extLst>
+          </p:cNvPr>
+          <p:cNvSpPr>
+            <a:spLocks noGrp="1"/>
+          </p:cNvSpPr>
+          <p:nvPr>
+            <p:ph type="title"/>
+          </p:nvPr>
+        </p:nvSpPr>
+        <p:spPr/>
+        <p:txBody>
+          <a:bodyPr/>
+          <a:lstStyle/>
+          <a:p>
+            <a:r>
+              <a:rPr lang="en-US" dirty="0"/>
+              <a:t>Wireframes – History – Flex Box</a:t>
+            </a:r>
+            <a:endParaRPr lang="en-MY" dirty="0"/>
+          </a:p>
+        </p:txBody>
+      </p:sp>
+      <p:pic>
+        <p:nvPicPr>
+          <p:cNvPr id="5" name="Content Placeholder 4">
+            <a:extLst>
+              <a:ext uri="{FF2B5EF4-FFF2-40B4-BE49-F238E27FC236}">
+                <a16:creationId xmlns:a16="http://schemas.microsoft.com/office/drawing/2014/main" id="{9FF7E6FD-56AD-4A67-A149-B174DA554215}"/>
+              </a:ext>
+            </a:extLst>
+          </p:cNvPr>
+          <p:cNvPicPr>
+            <a:picLocks noGrp="1" noChangeAspect="1"/>
+          </p:cNvPicPr>
+          <p:nvPr>
+            <p:ph idx="1"/>
+          </p:nvPr>
+        </p:nvPicPr>
+        <p:blipFill>
+          <a:blip r:embed="rId2"/>
+          <a:stretch>
+            <a:fillRect/>
+          </a:stretch>
+        </p:blipFill>
+        <p:spPr>
+          <a:xfrm>
+            <a:off x="2495745" y="1374913"/>
+            <a:ext cx="7200510" cy="5483087"/>
+          </a:xfrm>
+        </p:spPr>
+      </p:pic>
+    </p:spTree>
+    <p:extLst>
+      <p:ext uri="{BB962C8B-B14F-4D97-AF65-F5344CB8AC3E}">
+        <p14:creationId xmlns:p14="http://schemas.microsoft.com/office/powerpoint/2010/main" val="3884812326"/>
+      </p:ext>
+    </p:extLst>
+  </p:cSld>
+  <p:clrMapOvr>
+    <a:masterClrMapping/>
+  </p:clrMapOvr>
+</p:sld>
+</file>
+
+<file path=ppt/slides/slide7.xml><?xml version="1.0" encoding="utf-8"?>
+<p:sld xmlns:a="http://schemas.openxmlformats.org/drawingml/2006/main" xmlns:r="http://schemas.openxmlformats.org/officeDocument/2006/relationships" xmlns:p="http://schemas.openxmlformats.org/presentationml/2006/main">
+  <p:cSld>
+    <p:spTree>
+      <p:nvGrpSpPr>
+        <p:cNvPr id="1" name=""/>
+        <p:cNvGrpSpPr/>
+        <p:nvPr/>
+      </p:nvGrpSpPr>
+      <p:grpSpPr>
+        <a:xfrm>
+          <a:off x="0" y="0"/>
+          <a:ext cx="0" cy="0"/>
+          <a:chOff x="0" y="0"/>
+          <a:chExt cx="0" cy="0"/>
+        </a:xfrm>
+      </p:grpSpPr>
+      <p:sp>
+        <p:nvSpPr>
+          <p:cNvPr id="2" name="Title 1">
+            <a:extLst>
+              <a:ext uri="{FF2B5EF4-FFF2-40B4-BE49-F238E27FC236}">
+                <a16:creationId xmlns:a16="http://schemas.microsoft.com/office/drawing/2014/main" id="{51D60014-3538-4691-A4F5-2A7FE9DB5BD2}"/>
+              </a:ext>
+            </a:extLst>
+          </p:cNvPr>
+          <p:cNvSpPr>
+            <a:spLocks noGrp="1"/>
+          </p:cNvSpPr>
+          <p:nvPr>
+            <p:ph type="title"/>
+          </p:nvPr>
+        </p:nvSpPr>
+        <p:spPr/>
+        <p:txBody>
+          <a:bodyPr/>
+          <a:lstStyle/>
+          <a:p>
+            <a:r>
+              <a:rPr lang="en-US" dirty="0"/>
+              <a:t>Wireframes – Image links</a:t>
+            </a:r>
+            <a:endParaRPr lang="en-MY" dirty="0"/>
+          </a:p>
+        </p:txBody>
+      </p:sp>
+      <p:pic>
+        <p:nvPicPr>
+          <p:cNvPr id="5" name="Content Placeholder 4">
+            <a:extLst>
+              <a:ext uri="{FF2B5EF4-FFF2-40B4-BE49-F238E27FC236}">
+                <a16:creationId xmlns:a16="http://schemas.microsoft.com/office/drawing/2014/main" id="{BE97F7A6-23E3-4035-89CF-9F3DFD5CD1B1}"/>
+              </a:ext>
+            </a:extLst>
+          </p:cNvPr>
+          <p:cNvPicPr>
+            <a:picLocks noGrp="1" noChangeAspect="1"/>
+          </p:cNvPicPr>
+          <p:nvPr>
+            <p:ph idx="1"/>
+          </p:nvPr>
+        </p:nvPicPr>
+        <p:blipFill>
+          <a:blip r:embed="rId2"/>
+          <a:stretch>
+            <a:fillRect/>
+          </a:stretch>
+        </p:blipFill>
+        <p:spPr>
+          <a:xfrm>
+            <a:off x="2516149" y="1423358"/>
+            <a:ext cx="7159702" cy="5434642"/>
+          </a:xfrm>
+        </p:spPr>
+      </p:pic>
+    </p:spTree>
+    <p:extLst>
+      <p:ext uri="{BB962C8B-B14F-4D97-AF65-F5344CB8AC3E}">
+        <p14:creationId xmlns:p14="http://schemas.microsoft.com/office/powerpoint/2010/main" val="1985593430"/>
+      </p:ext>
+    </p:extLst>
+  </p:cSld>
+  <p:clrMapOvr>
+    <a:masterClrMapping/>
+  </p:clrMapOvr>
+</p:sld>
+</file>
+
+<file path=ppt/slides/slide8.xml><?xml version="1.0" encoding="utf-8"?>
+<p:sld xmlns:a="http://schemas.openxmlformats.org/drawingml/2006/main" xmlns:r="http://schemas.openxmlformats.org/officeDocument/2006/relationships" xmlns:p="http://schemas.openxmlformats.org/presentationml/2006/main">
+  <p:cSld>
+    <p:spTree>
+      <p:nvGrpSpPr>
+        <p:cNvPr id="1" name=""/>
+        <p:cNvGrpSpPr/>
+        <p:nvPr/>
+      </p:nvGrpSpPr>
+      <p:grpSpPr>
+        <a:xfrm>
+          <a:off x="0" y="0"/>
+          <a:ext cx="0" cy="0"/>
+          <a:chOff x="0" y="0"/>
+          <a:chExt cx="0" cy="0"/>
+        </a:xfrm>
+      </p:grpSpPr>
+      <p:sp>
+        <p:nvSpPr>
+          <p:cNvPr id="2" name="Title 1">
+            <a:extLst>
+              <a:ext uri="{FF2B5EF4-FFF2-40B4-BE49-F238E27FC236}">
+                <a16:creationId xmlns:a16="http://schemas.microsoft.com/office/drawing/2014/main" id="{358D1322-5953-49ED-ABA3-D08C4D8F25E0}"/>
+              </a:ext>
+            </a:extLst>
+          </p:cNvPr>
+          <p:cNvSpPr>
+            <a:spLocks noGrp="1"/>
+          </p:cNvSpPr>
+          <p:nvPr>
+            <p:ph type="title"/>
+          </p:nvPr>
+        </p:nvSpPr>
+        <p:spPr/>
+        <p:txBody>
+          <a:bodyPr/>
+          <a:lstStyle/>
+          <a:p>
+            <a:r>
+              <a:rPr lang="en-US" dirty="0"/>
+              <a:t>Wireframes – Contact – Table</a:t>
+            </a:r>
+            <a:endParaRPr lang="en-MY" dirty="0"/>
+          </a:p>
+        </p:txBody>
+      </p:sp>
+      <p:pic>
+        <p:nvPicPr>
+          <p:cNvPr id="5" name="Content Placeholder 4">
+            <a:extLst>
+              <a:ext uri="{FF2B5EF4-FFF2-40B4-BE49-F238E27FC236}">
+                <a16:creationId xmlns:a16="http://schemas.microsoft.com/office/drawing/2014/main" id="{6C971A80-C716-4443-9047-BC008B4D2CF7}"/>
+              </a:ext>
+            </a:extLst>
+          </p:cNvPr>
+          <p:cNvPicPr>
+            <a:picLocks noGrp="1" noChangeAspect="1"/>
+          </p:cNvPicPr>
+          <p:nvPr>
+            <p:ph idx="1"/>
+          </p:nvPr>
+        </p:nvPicPr>
+        <p:blipFill>
+          <a:blip r:embed="rId2"/>
+          <a:stretch>
+            <a:fillRect/>
+          </a:stretch>
+        </p:blipFill>
+        <p:spPr>
+          <a:xfrm>
+            <a:off x="2652490" y="1428750"/>
+            <a:ext cx="6887019" cy="5200679"/>
+          </a:xfrm>
+        </p:spPr>
+      </p:pic>
+    </p:spTree>
+    <p:extLst>
+      <p:ext uri="{BB962C8B-B14F-4D97-AF65-F5344CB8AC3E}">
+        <p14:creationId xmlns:p14="http://schemas.microsoft.com/office/powerpoint/2010/main" val="809858828"/>
+      </p:ext>
+    </p:extLst>
+  </p:cSld>
+  <p:clrMapOvr>
+    <a:masterClrMapping/>
+  </p:clrMapOvr>
+</p:sld>
+</file>
+
+<file path=ppt/slides/slide9.xml><?xml version="1.0" encoding="utf-8"?>
+<p:sld xmlns:a="http://schemas.openxmlformats.org/drawingml/2006/main" xmlns:r="http://schemas.openxmlformats.org/officeDocument/2006/relationships" xmlns:p="http://schemas.openxmlformats.org/presentationml/2006/main">
+  <p:cSld>
+    <p:spTree>
+      <p:nvGrpSpPr>
+        <p:cNvPr id="1" name=""/>
+        <p:cNvGrpSpPr/>
+        <p:nvPr/>
+      </p:nvGrpSpPr>
+      <p:grpSpPr>
+        <a:xfrm>
+          <a:off x="0" y="0"/>
+          <a:ext cx="0" cy="0"/>
+          <a:chOff x="0" y="0"/>
+          <a:chExt cx="0" cy="0"/>
+        </a:xfrm>
+      </p:grpSpPr>
+      <p:sp>
+        <p:nvSpPr>
+          <p:cNvPr id="2" name="Title 1">
+            <a:extLst>
+              <a:ext uri="{FF2B5EF4-FFF2-40B4-BE49-F238E27FC236}">
+                <a16:creationId xmlns:a16="http://schemas.microsoft.com/office/drawing/2014/main" id="{7C147972-0F60-44DE-8A33-2FCED832EC63}"/>
+              </a:ext>
+            </a:extLst>
+          </p:cNvPr>
+          <p:cNvSpPr>
+            <a:spLocks noGrp="1"/>
+          </p:cNvSpPr>
+          <p:nvPr>
+            <p:ph type="title"/>
+          </p:nvPr>
+        </p:nvSpPr>
+        <p:spPr>
+          <a:xfrm>
+            <a:off x="1295400" y="124112"/>
+            <a:ext cx="9601200" cy="1485900"/>
+          </a:xfrm>
+        </p:spPr>
+        <p:txBody>
+          <a:bodyPr/>
+          <a:lstStyle/>
+          <a:p>
+            <a:r>
+              <a:rPr lang="en-US" dirty="0"/>
+              <a:t>Wireframes – Phone size</a:t>
+            </a:r>
+            <a:endParaRPr lang="en-MY" dirty="0"/>
+          </a:p>
+        </p:txBody>
+      </p:sp>
+      <p:pic>
+        <p:nvPicPr>
+          <p:cNvPr id="13" name="Content Placeholder 12">
+            <a:extLst>
+              <a:ext uri="{FF2B5EF4-FFF2-40B4-BE49-F238E27FC236}">
+                <a16:creationId xmlns:a16="http://schemas.microsoft.com/office/drawing/2014/main" id="{CEE3F66A-454E-4E25-A404-492B03295F9C}"/>
+              </a:ext>
+            </a:extLst>
+          </p:cNvPr>
+          <p:cNvPicPr>
+            <a:picLocks noGrp="1" noChangeAspect="1"/>
+          </p:cNvPicPr>
+          <p:nvPr>
+            <p:ph idx="1"/>
+          </p:nvPr>
+        </p:nvPicPr>
+        <p:blipFill>
+          <a:blip r:embed="rId2"/>
+          <a:stretch>
+            <a:fillRect/>
+          </a:stretch>
+        </p:blipFill>
+        <p:spPr>
+          <a:xfrm>
+            <a:off x="2006659" y="964380"/>
+            <a:ext cx="1770212" cy="5893620"/>
+          </a:xfrm>
+        </p:spPr>
+      </p:pic>
+      <p:pic>
+        <p:nvPicPr>
+          <p:cNvPr id="15" name="Picture 14">
+            <a:extLst>
+              <a:ext uri="{FF2B5EF4-FFF2-40B4-BE49-F238E27FC236}">
+                <a16:creationId xmlns:a16="http://schemas.microsoft.com/office/drawing/2014/main" id="{084B9C2B-4C09-408E-B4DF-76812F73B57A}"/>
+              </a:ext>
+            </a:extLst>
+          </p:cNvPr>
+          <p:cNvPicPr>
+            <a:picLocks noChangeAspect="1"/>
+          </p:cNvPicPr>
+          <p:nvPr/>
+        </p:nvPicPr>
+        <p:blipFill>
+          <a:blip r:embed="rId3"/>
+          <a:stretch>
+            <a:fillRect/>
+          </a:stretch>
+        </p:blipFill>
+        <p:spPr>
+          <a:xfrm>
+            <a:off x="4209547" y="886940"/>
+            <a:ext cx="1886453" cy="5893620"/>
+          </a:xfrm>
+          <a:prstGeom prst="rect">
+            <a:avLst/>
+          </a:prstGeom>
+        </p:spPr>
+      </p:pic>
+      <p:pic>
+        <p:nvPicPr>
+          <p:cNvPr id="17" name="Picture 16">
+            <a:extLst>
+              <a:ext uri="{FF2B5EF4-FFF2-40B4-BE49-F238E27FC236}">
+                <a16:creationId xmlns:a16="http://schemas.microsoft.com/office/drawing/2014/main" id="{44391A28-278A-44B5-AAEC-DBD9D7D450BE}"/>
+              </a:ext>
+            </a:extLst>
+          </p:cNvPr>
+          <p:cNvPicPr>
+            <a:picLocks noChangeAspect="1"/>
+          </p:cNvPicPr>
+          <p:nvPr/>
+        </p:nvPicPr>
+        <p:blipFill>
+          <a:blip r:embed="rId4"/>
+          <a:stretch>
+            <a:fillRect/>
+          </a:stretch>
+        </p:blipFill>
+        <p:spPr>
+          <a:xfrm>
+            <a:off x="6349447" y="964380"/>
+            <a:ext cx="1886453" cy="3380129"/>
+          </a:xfrm>
+          <a:prstGeom prst="rect">
+            <a:avLst/>
+          </a:prstGeom>
+        </p:spPr>
+      </p:pic>
+    </p:spTree>
+    <p:extLst>
+      <p:ext uri="{BB962C8B-B14F-4D97-AF65-F5344CB8AC3E}">
+        <p14:creationId xmlns:p14="http://schemas.microsoft.com/office/powerpoint/2010/main" val="894438421"/>
       </p:ext>
     </p:extLst>
   </p:cSld>

</xml_diff>

<commit_message>
edited presentation and read me file
</commit_message>
<xml_diff>
--- a/ppt/presentation.pptx
+++ b/ppt/presentation.pptx
@@ -117,6 +117,11 @@
       </a:defRPr>
     </a:lvl9pPr>
   </p:defaultTextStyle>
+  <p:extLst>
+    <p:ext uri="{EFAFB233-063F-42B5-8137-9DF3F51BA10A}">
+      <p15:sldGuideLst xmlns:p15="http://schemas.microsoft.com/office/powerpoint/2012/main"/>
+    </p:ext>
+  </p:extLst>
 </p:presentation>
 </file>
 
@@ -290,7 +295,7 @@
             <a:fld id="{87DE6118-2437-4B30-8E3C-4D2BE6020583}" type="datetimeFigureOut">
               <a:rPr lang="en-US" dirty="0"/>
               <a:pPr/>
-              <a:t>3/23/2019</a:t>
+              <a:t>3/24/2019</a:t>
             </a:fld>
             <a:endParaRPr lang="en-US" dirty="0"/>
           </a:p>
@@ -616,7 +621,7 @@
           <a:p>
             <a:fld id="{87DE6118-2437-4B30-8E3C-4D2BE6020583}" type="datetimeFigureOut">
               <a:rPr lang="en-US" dirty="0"/>
-              <a:t>3/23/2019</a:t>
+              <a:t>3/24/2019</a:t>
             </a:fld>
             <a:endParaRPr lang="en-US" dirty="0"/>
           </a:p>
@@ -791,7 +796,7 @@
           <a:p>
             <a:fld id="{87DE6118-2437-4B30-8E3C-4D2BE6020583}" type="datetimeFigureOut">
               <a:rPr lang="en-US" dirty="0"/>
-              <a:t>3/23/2019</a:t>
+              <a:t>3/24/2019</a:t>
             </a:fld>
             <a:endParaRPr lang="en-US" dirty="0"/>
           </a:p>
@@ -956,7 +961,7 @@
           <a:p>
             <a:fld id="{87DE6118-2437-4B30-8E3C-4D2BE6020583}" type="datetimeFigureOut">
               <a:rPr lang="en-US" dirty="0"/>
-              <a:t>3/23/2019</a:t>
+              <a:t>3/24/2019</a:t>
             </a:fld>
             <a:endParaRPr lang="en-US" dirty="0"/>
           </a:p>
@@ -1229,7 +1234,7 @@
             <a:fld id="{87DE6118-2437-4B30-8E3C-4D2BE6020583}" type="datetimeFigureOut">
               <a:rPr lang="en-US" dirty="0"/>
               <a:pPr/>
-              <a:t>3/23/2019</a:t>
+              <a:t>3/24/2019</a:t>
             </a:fld>
             <a:endParaRPr lang="en-US" dirty="0"/>
           </a:p>
@@ -1619,7 +1624,7 @@
           <a:p>
             <a:fld id="{87DE6118-2437-4B30-8E3C-4D2BE6020583}" type="datetimeFigureOut">
               <a:rPr lang="en-US" dirty="0"/>
-              <a:t>3/23/2019</a:t>
+              <a:t>3/24/2019</a:t>
             </a:fld>
             <a:endParaRPr lang="en-US" dirty="0"/>
           </a:p>
@@ -2091,7 +2096,7 @@
           <a:p>
             <a:fld id="{87DE6118-2437-4B30-8E3C-4D2BE6020583}" type="datetimeFigureOut">
               <a:rPr lang="en-US" dirty="0"/>
-              <a:t>3/23/2019</a:t>
+              <a:t>3/24/2019</a:t>
             </a:fld>
             <a:endParaRPr lang="en-US" dirty="0"/>
           </a:p>
@@ -2204,7 +2209,7 @@
           <a:p>
             <a:fld id="{87DE6118-2437-4B30-8E3C-4D2BE6020583}" type="datetimeFigureOut">
               <a:rPr lang="en-US" dirty="0"/>
-              <a:t>3/23/2019</a:t>
+              <a:t>3/24/2019</a:t>
             </a:fld>
             <a:endParaRPr lang="en-US" dirty="0"/>
           </a:p>
@@ -2294,7 +2299,7 @@
           <a:p>
             <a:fld id="{87DE6118-2437-4B30-8E3C-4D2BE6020583}" type="datetimeFigureOut">
               <a:rPr lang="en-US" dirty="0"/>
-              <a:t>3/23/2019</a:t>
+              <a:t>3/24/2019</a:t>
             </a:fld>
             <a:endParaRPr lang="en-US" dirty="0"/>
           </a:p>
@@ -2636,7 +2641,7 @@
             <a:fld id="{87DE6118-2437-4B30-8E3C-4D2BE6020583}" type="datetimeFigureOut">
               <a:rPr lang="en-US" dirty="0"/>
               <a:pPr/>
-              <a:t>3/23/2019</a:t>
+              <a:t>3/24/2019</a:t>
             </a:fld>
             <a:endParaRPr lang="en-US" dirty="0"/>
           </a:p>
@@ -3021,7 +3026,7 @@
             <a:fld id="{87DE6118-2437-4B30-8E3C-4D2BE6020583}" type="datetimeFigureOut">
               <a:rPr lang="en-US" dirty="0"/>
               <a:pPr/>
-              <a:t>3/23/2019</a:t>
+              <a:t>3/24/2019</a:t>
             </a:fld>
             <a:endParaRPr lang="en-US" dirty="0"/>
           </a:p>
@@ -3296,7 +3301,7 @@
             <a:fld id="{87DE6118-2437-4B30-8E3C-4D2BE6020583}" type="datetimeFigureOut">
               <a:rPr lang="en-US" dirty="0"/>
               <a:pPr/>
-              <a:t>3/23/2019</a:t>
+              <a:t>3/24/2019</a:t>
             </a:fld>
             <a:endParaRPr lang="en-US" dirty="0"/>
           </a:p>
@@ -4706,7 +4711,7 @@
           <a:p>
             <a:r>
               <a:rPr lang="en-MY" dirty="0"/>
-              <a:t>title attribute on anchor tag, button, images and links</a:t>
+              <a:t>title attribute on anchor tag, button, images and links for a description</a:t>
             </a:r>
           </a:p>
           <a:p>

</xml_diff>

<commit_message>
edited presentation and read me file and index file
</commit_message>
<xml_diff>
--- a/ppt/presentation.pptx
+++ b/ppt/presentation.pptx
@@ -15,10 +15,11 @@
     <p:sldId id="263" r:id="rId9"/>
     <p:sldId id="264" r:id="rId10"/>
     <p:sldId id="265" r:id="rId11"/>
-    <p:sldId id="266" r:id="rId12"/>
-    <p:sldId id="267" r:id="rId13"/>
-    <p:sldId id="269" r:id="rId14"/>
-    <p:sldId id="268" r:id="rId15"/>
+    <p:sldId id="270" r:id="rId12"/>
+    <p:sldId id="266" r:id="rId13"/>
+    <p:sldId id="267" r:id="rId14"/>
+    <p:sldId id="269" r:id="rId15"/>
+    <p:sldId id="268" r:id="rId16"/>
   </p:sldIdLst>
   <p:sldSz cx="12192000" cy="6858000"/>
   <p:notesSz cx="6858000" cy="9144000"/>
@@ -4089,7 +4090,7 @@
           <p:cNvPr id="2" name="Title 1">
             <a:extLst>
               <a:ext uri="{FF2B5EF4-FFF2-40B4-BE49-F238E27FC236}">
-                <a16:creationId xmlns:a16="http://schemas.microsoft.com/office/drawing/2014/main" id="{BD593863-3CAE-4D32-BF00-60BE6E07AC13}"/>
+                <a16:creationId xmlns:a16="http://schemas.microsoft.com/office/drawing/2014/main" id="{15B2894E-393F-4B18-8C23-58DE6050C70B}"/>
               </a:ext>
             </a:extLst>
           </p:cNvPr>
@@ -4106,46 +4107,151 @@
           <a:lstStyle/>
           <a:p>
             <a:r>
-              <a:rPr lang="en-US" dirty="0"/>
-              <a:t>Trello</a:t>
-            </a:r>
+              <a:rPr lang="en-MY" b="1" dirty="0"/>
+              <a:t>Project Planning and Timeline</a:t>
+            </a:r>
+            <a:br>
+              <a:rPr lang="en-MY" dirty="0"/>
+            </a:br>
             <a:endParaRPr lang="en-MY" dirty="0"/>
           </a:p>
         </p:txBody>
       </p:sp>
-      <p:pic>
-        <p:nvPicPr>
-          <p:cNvPr id="7" name="Content Placeholder 6">
+      <p:sp>
+        <p:nvSpPr>
+          <p:cNvPr id="5" name="Content Placeholder 4">
             <a:extLst>
               <a:ext uri="{FF2B5EF4-FFF2-40B4-BE49-F238E27FC236}">
-                <a16:creationId xmlns:a16="http://schemas.microsoft.com/office/drawing/2014/main" id="{BE5C2AD5-2F14-48B5-B90E-5EEE5E613F24}"/>
+                <a16:creationId xmlns:a16="http://schemas.microsoft.com/office/drawing/2014/main" id="{B9DE53D6-8A1B-4F09-9DE8-7492994D215F}"/>
               </a:ext>
             </a:extLst>
           </p:cNvPr>
-          <p:cNvPicPr>
-            <a:picLocks noGrp="1" noChangeAspect="1"/>
-          </p:cNvPicPr>
+          <p:cNvSpPr>
+            <a:spLocks noGrp="1"/>
+          </p:cNvSpPr>
           <p:nvPr>
             <p:ph idx="1"/>
           </p:nvPr>
-        </p:nvPicPr>
-        <p:blipFill>
-          <a:blip r:embed="rId2"/>
-          <a:stretch>
-            <a:fillRect/>
-          </a:stretch>
-        </p:blipFill>
-        <p:spPr>
-          <a:xfrm>
-            <a:off x="1749288" y="1528938"/>
-            <a:ext cx="9378494" cy="4510740"/>
-          </a:xfrm>
-        </p:spPr>
-      </p:pic>
+        </p:nvSpPr>
+        <p:spPr>
+          <a:xfrm>
+            <a:off x="1371600" y="1775790"/>
+            <a:ext cx="9601200" cy="4982817"/>
+          </a:xfrm>
+        </p:spPr>
+        <p:txBody>
+          <a:bodyPr>
+            <a:normAutofit/>
+          </a:bodyPr>
+          <a:lstStyle/>
+          <a:p>
+            <a:pPr marL="0" indent="0">
+              <a:buNone/>
+            </a:pPr>
+            <a:r>
+              <a:rPr lang="en-MY" dirty="0"/>
+              <a:t>Day 1-2</a:t>
+            </a:r>
+          </a:p>
+          <a:p>
+            <a:pPr lvl="1"/>
+            <a:r>
+              <a:rPr lang="en-MY" dirty="0"/>
+              <a:t>1. Research and Brainstorming</a:t>
+            </a:r>
+          </a:p>
+          <a:p>
+            <a:pPr lvl="1"/>
+            <a:r>
+              <a:rPr lang="en-MY" dirty="0"/>
+              <a:t>2. Design wireframe layouts</a:t>
+            </a:r>
+          </a:p>
+          <a:p>
+            <a:pPr lvl="1"/>
+            <a:r>
+              <a:rPr lang="en-MY" dirty="0"/>
+              <a:t>3. Choose a </a:t>
+            </a:r>
+            <a:r>
+              <a:rPr lang="en-MY" dirty="0" err="1"/>
+              <a:t>color</a:t>
+            </a:r>
+            <a:r>
+              <a:rPr lang="en-MY" dirty="0"/>
+              <a:t> scheme and font styles</a:t>
+            </a:r>
+          </a:p>
+          <a:p>
+            <a:pPr marL="0" indent="0">
+              <a:buNone/>
+            </a:pPr>
+            <a:r>
+              <a:rPr lang="en-MY" dirty="0"/>
+              <a:t>Day 2-4</a:t>
+            </a:r>
+          </a:p>
+          <a:p>
+            <a:pPr lvl="1"/>
+            <a:r>
+              <a:rPr lang="en-MY" dirty="0"/>
+              <a:t>4. Collect and resize images</a:t>
+            </a:r>
+          </a:p>
+          <a:p>
+            <a:pPr lvl="1"/>
+            <a:r>
+              <a:rPr lang="en-MY" dirty="0"/>
+              <a:t>5. Use of flex box and tables</a:t>
+            </a:r>
+          </a:p>
+          <a:p>
+            <a:pPr lvl="1"/>
+            <a:r>
+              <a:rPr lang="en-MY" dirty="0"/>
+              <a:t>6. Protype testing Html, </a:t>
+            </a:r>
+            <a:r>
+              <a:rPr lang="en-MY" dirty="0" err="1"/>
+              <a:t>Css</a:t>
+            </a:r>
+            <a:r>
+              <a:rPr lang="en-MY" dirty="0"/>
+              <a:t> and JavaScript</a:t>
+            </a:r>
+          </a:p>
+          <a:p>
+            <a:pPr marL="0" indent="0">
+              <a:buNone/>
+            </a:pPr>
+            <a:r>
+              <a:rPr lang="en-MY" dirty="0"/>
+              <a:t>Day 4-6</a:t>
+            </a:r>
+          </a:p>
+          <a:p>
+            <a:pPr lvl="1"/>
+            <a:r>
+              <a:rPr lang="en-MY" dirty="0"/>
+              <a:t>7. Evaluate the design</a:t>
+            </a:r>
+          </a:p>
+          <a:p>
+            <a:pPr lvl="1"/>
+            <a:r>
+              <a:rPr lang="en-MY" dirty="0"/>
+              <a:t>8. Produce final product</a:t>
+            </a:r>
+          </a:p>
+          <a:p>
+            <a:endParaRPr lang="en-MY" dirty="0"/>
+          </a:p>
+        </p:txBody>
+      </p:sp>
     </p:spTree>
     <p:extLst>
       <p:ext uri="{BB962C8B-B14F-4D97-AF65-F5344CB8AC3E}">
-        <p14:creationId xmlns:p14="http://schemas.microsoft.com/office/powerpoint/2010/main" val="2325242116"/>
+        <p14:creationId xmlns:p14="http://schemas.microsoft.com/office/powerpoint/2010/main" val="1062740550"/>
       </p:ext>
     </p:extLst>
   </p:cSld>
@@ -4177,7 +4283,7 @@
           <p:cNvPr id="2" name="Title 1">
             <a:extLst>
               <a:ext uri="{FF2B5EF4-FFF2-40B4-BE49-F238E27FC236}">
-                <a16:creationId xmlns:a16="http://schemas.microsoft.com/office/drawing/2014/main" id="{1987A56B-6D89-4FEE-A160-92A9613DE616}"/>
+                <a16:creationId xmlns:a16="http://schemas.microsoft.com/office/drawing/2014/main" id="{BD593863-3CAE-4D32-BF00-60BE6E07AC13}"/>
               </a:ext>
             </a:extLst>
           </p:cNvPr>
@@ -4203,10 +4309,10 @@
       </p:sp>
       <p:pic>
         <p:nvPicPr>
-          <p:cNvPr id="5" name="Content Placeholder 4">
+          <p:cNvPr id="7" name="Content Placeholder 6">
             <a:extLst>
               <a:ext uri="{FF2B5EF4-FFF2-40B4-BE49-F238E27FC236}">
-                <a16:creationId xmlns:a16="http://schemas.microsoft.com/office/drawing/2014/main" id="{C7879762-FC31-41EB-923F-A153C8891682}"/>
+                <a16:creationId xmlns:a16="http://schemas.microsoft.com/office/drawing/2014/main" id="{BE5C2AD5-2F14-48B5-B90E-5EEE5E613F24}"/>
               </a:ext>
             </a:extLst>
           </p:cNvPr>
@@ -4225,15 +4331,15 @@
         </p:blipFill>
         <p:spPr>
           <a:xfrm>
-            <a:off x="1595096" y="1601857"/>
-            <a:ext cx="9819437" cy="4581939"/>
+            <a:off x="1749288" y="1528938"/>
+            <a:ext cx="9378494" cy="4510740"/>
           </a:xfrm>
         </p:spPr>
       </p:pic>
     </p:spTree>
     <p:extLst>
       <p:ext uri="{BB962C8B-B14F-4D97-AF65-F5344CB8AC3E}">
-        <p14:creationId xmlns:p14="http://schemas.microsoft.com/office/powerpoint/2010/main" val="580348007"/>
+        <p14:creationId xmlns:p14="http://schemas.microsoft.com/office/powerpoint/2010/main" val="2325242116"/>
       </p:ext>
     </p:extLst>
   </p:cSld>
@@ -4265,6 +4371,94 @@
           <p:cNvPr id="2" name="Title 1">
             <a:extLst>
               <a:ext uri="{FF2B5EF4-FFF2-40B4-BE49-F238E27FC236}">
+                <a16:creationId xmlns:a16="http://schemas.microsoft.com/office/drawing/2014/main" id="{1987A56B-6D89-4FEE-A160-92A9613DE616}"/>
+              </a:ext>
+            </a:extLst>
+          </p:cNvPr>
+          <p:cNvSpPr>
+            <a:spLocks noGrp="1"/>
+          </p:cNvSpPr>
+          <p:nvPr>
+            <p:ph type="title"/>
+          </p:nvPr>
+        </p:nvSpPr>
+        <p:spPr/>
+        <p:txBody>
+          <a:bodyPr/>
+          <a:lstStyle/>
+          <a:p>
+            <a:r>
+              <a:rPr lang="en-US" dirty="0"/>
+              <a:t>Trello</a:t>
+            </a:r>
+            <a:endParaRPr lang="en-MY" dirty="0"/>
+          </a:p>
+        </p:txBody>
+      </p:sp>
+      <p:pic>
+        <p:nvPicPr>
+          <p:cNvPr id="5" name="Content Placeholder 4">
+            <a:extLst>
+              <a:ext uri="{FF2B5EF4-FFF2-40B4-BE49-F238E27FC236}">
+                <a16:creationId xmlns:a16="http://schemas.microsoft.com/office/drawing/2014/main" id="{C7879762-FC31-41EB-923F-A153C8891682}"/>
+              </a:ext>
+            </a:extLst>
+          </p:cNvPr>
+          <p:cNvPicPr>
+            <a:picLocks noGrp="1" noChangeAspect="1"/>
+          </p:cNvPicPr>
+          <p:nvPr>
+            <p:ph idx="1"/>
+          </p:nvPr>
+        </p:nvPicPr>
+        <p:blipFill>
+          <a:blip r:embed="rId2"/>
+          <a:stretch>
+            <a:fillRect/>
+          </a:stretch>
+        </p:blipFill>
+        <p:spPr>
+          <a:xfrm>
+            <a:off x="1595096" y="1601857"/>
+            <a:ext cx="9819437" cy="4581939"/>
+          </a:xfrm>
+        </p:spPr>
+      </p:pic>
+    </p:spTree>
+    <p:extLst>
+      <p:ext uri="{BB962C8B-B14F-4D97-AF65-F5344CB8AC3E}">
+        <p14:creationId xmlns:p14="http://schemas.microsoft.com/office/powerpoint/2010/main" val="580348007"/>
+      </p:ext>
+    </p:extLst>
+  </p:cSld>
+  <p:clrMapOvr>
+    <a:masterClrMapping/>
+  </p:clrMapOvr>
+</p:sld>
+</file>
+
+<file path=ppt/slides/slide14.xml><?xml version="1.0" encoding="utf-8"?>
+<p:sld xmlns:a="http://schemas.openxmlformats.org/drawingml/2006/main" xmlns:r="http://schemas.openxmlformats.org/officeDocument/2006/relationships" xmlns:p="http://schemas.openxmlformats.org/presentationml/2006/main">
+  <p:cSld>
+    <p:spTree>
+      <p:nvGrpSpPr>
+        <p:cNvPr id="1" name=""/>
+        <p:cNvGrpSpPr/>
+        <p:nvPr/>
+      </p:nvGrpSpPr>
+      <p:grpSpPr>
+        <a:xfrm>
+          <a:off x="0" y="0"/>
+          <a:ext cx="0" cy="0"/>
+          <a:chOff x="0" y="0"/>
+          <a:chExt cx="0" cy="0"/>
+        </a:xfrm>
+      </p:grpSpPr>
+      <p:sp>
+        <p:nvSpPr>
+          <p:cNvPr id="2" name="Title 1">
+            <a:extLst>
+              <a:ext uri="{FF2B5EF4-FFF2-40B4-BE49-F238E27FC236}">
                 <a16:creationId xmlns:a16="http://schemas.microsoft.com/office/drawing/2014/main" id="{7854C1D3-594F-48FA-BEA6-D5ACBB223A4B}"/>
               </a:ext>
             </a:extLst>
@@ -4331,7 +4525,7 @@
 </p:sld>
 </file>
 
-<file path=ppt/slides/slide14.xml><?xml version="1.0" encoding="utf-8"?>
+<file path=ppt/slides/slide15.xml><?xml version="1.0" encoding="utf-8"?>
 <p:sld xmlns:a="http://schemas.openxmlformats.org/drawingml/2006/main" xmlns:r="http://schemas.openxmlformats.org/officeDocument/2006/relationships" xmlns:p="http://schemas.openxmlformats.org/presentationml/2006/main">
   <p:cSld>
     <p:spTree>
@@ -4467,15 +4661,33 @@
             <p:ph type="title"/>
           </p:nvPr>
         </p:nvSpPr>
-        <p:spPr/>
-        <p:txBody>
-          <a:bodyPr/>
+        <p:spPr>
+          <a:xfrm>
+            <a:off x="1371600" y="685800"/>
+            <a:ext cx="10820400" cy="1485900"/>
+          </a:xfrm>
+        </p:spPr>
+        <p:txBody>
+          <a:bodyPr>
+            <a:normAutofit fontScale="90000"/>
+          </a:bodyPr>
           <a:lstStyle/>
           <a:p>
             <a:r>
               <a:rPr lang="en-US" dirty="0"/>
-              <a:t>Design Process		 Functionality</a:t>
-            </a:r>
+              <a:t>Design Process		   Functionality and</a:t>
+            </a:r>
+            <a:r>
+              <a:rPr lang="en-MY" b="1" dirty="0"/>
+              <a:t> </a:t>
+            </a:r>
+            <a:r>
+              <a:rPr lang="en-MY" dirty="0"/>
+              <a:t>features</a:t>
+            </a:r>
+            <a:br>
+              <a:rPr lang="en-MY" dirty="0"/>
+            </a:br>
             <a:br>
               <a:rPr lang="en-MY" dirty="0"/>
             </a:br>
@@ -4595,8 +4807,8 @@
         </p:nvSpPr>
         <p:spPr>
           <a:xfrm>
-            <a:off x="6172200" y="2070652"/>
-            <a:ext cx="5486400" cy="2140227"/>
+            <a:off x="6414052" y="2070652"/>
+            <a:ext cx="5486400" cy="3932584"/>
           </a:xfrm>
         </p:spPr>
         <p:txBody>
@@ -4619,6 +4831,12 @@
           <a:p>
             <a:r>
               <a:rPr lang="en-MY" dirty="0"/>
+              <a:t>JavaScript - Welcome message</a:t>
+            </a:r>
+          </a:p>
+          <a:p>
+            <a:r>
+              <a:rPr lang="en-MY" dirty="0"/>
               <a:t>JavaScript - date, time, weather</a:t>
             </a:r>
           </a:p>
@@ -4627,6 +4845,21 @@
               <a:rPr lang="en-MY" dirty="0"/>
               <a:t>Links - LinkedIn, GitHub and Google Maps</a:t>
             </a:r>
+          </a:p>
+          <a:p>
+            <a:r>
+              <a:rPr lang="en-MY" dirty="0"/>
+              <a:t>Gallery</a:t>
+            </a:r>
+          </a:p>
+          <a:p>
+            <a:r>
+              <a:rPr lang="en-MY" dirty="0"/>
+              <a:t>Icon in the tab</a:t>
+            </a:r>
+          </a:p>
+          <a:p>
+            <a:endParaRPr lang="en-MY" dirty="0"/>
           </a:p>
           <a:p>
             <a:endParaRPr lang="en-MY" dirty="0"/>
@@ -4731,7 +4964,15 @@
           <a:p>
             <a:r>
               <a:rPr lang="en-MY" dirty="0"/>
-              <a:t>alt attribute on image tags for accessibility</a:t>
+              <a:t>alt attribute on image tags and </a:t>
+            </a:r>
+            <a:r>
+              <a:rPr lang="en-MY" dirty="0" err="1"/>
+              <a:t>lang</a:t>
+            </a:r>
+            <a:r>
+              <a:rPr lang="en-MY" dirty="0"/>
+              <a:t> attribute on the html tag for accessibility</a:t>
             </a:r>
           </a:p>
           <a:p>

</xml_diff>